<commit_message>
Updated Program Structure draft
</commit_message>
<xml_diff>
--- a/Design:10.08/ProgramStructure.pptx
+++ b/Design:10.08/ProgramStructure.pptx
@@ -10,6 +10,7 @@
   <p:sldIdLst>
     <p:sldId id="256" r:id="rId3"/>
     <p:sldId id="257" r:id="rId5"/>
+    <p:sldId id="258" r:id="rId6"/>
   </p:sldIdLst>
   <p:sldSz cx="12192000" cy="6858000"/>
   <p:notesSz cx="6858000" cy="9144000"/>
@@ -4560,7 +4561,7 @@
               <a:t>模型训练模块（</a:t>
             </a:r>
             <a:r>
-              <a:rPr lang="" altLang="zh-CN" dirty="0">
+              <a:rPr lang="en-US" altLang="zh-CN" dirty="0">
                 <a:latin typeface="微软雅黑" panose="020B0503020204020204" pitchFamily="34" charset="-122"/>
                 <a:ea typeface="微软雅黑" panose="020B0503020204020204" pitchFamily="34" charset="-122"/>
               </a:rPr>
@@ -5987,6 +5988,1011 @@
               <a:latin typeface="微软雅黑" panose="020B0503020204020204" pitchFamily="34" charset="-122"/>
               <a:ea typeface="微软雅黑" panose="020B0503020204020204" pitchFamily="34" charset="-122"/>
             </a:endParaRPr>
+          </a:p>
+        </p:txBody>
+      </p:sp>
+    </p:spTree>
+  </p:cSld>
+  <p:clrMapOvr>
+    <a:masterClrMapping/>
+  </p:clrMapOvr>
+</p:sld>
+</file>
+
+<file path=ppt/slides/slide3.xml><?xml version="1.0" encoding="utf-8"?>
+<p:sld xmlns:a="http://schemas.openxmlformats.org/drawingml/2006/main" xmlns:r="http://schemas.openxmlformats.org/officeDocument/2006/relationships" xmlns:p="http://schemas.openxmlformats.org/presentationml/2006/main">
+  <p:cSld>
+    <p:spTree>
+      <p:nvGrpSpPr>
+        <p:cNvPr id="1" name=""/>
+        <p:cNvGrpSpPr/>
+        <p:nvPr/>
+      </p:nvGrpSpPr>
+      <p:grpSpPr/>
+      <p:grpSp>
+        <p:nvGrpSpPr>
+          <p:cNvPr id="13" name="组合 12"/>
+          <p:cNvGrpSpPr/>
+          <p:nvPr/>
+        </p:nvGrpSpPr>
+        <p:grpSpPr>
+          <a:xfrm>
+            <a:off x="-30480" y="-36830"/>
+            <a:ext cx="7393305" cy="5266690"/>
+            <a:chOff x="35" y="-1"/>
+            <a:chExt cx="10320" cy="7353"/>
+          </a:xfrm>
+        </p:grpSpPr>
+        <p:grpSp>
+          <p:nvGrpSpPr>
+            <p:cNvPr id="4" name="组合 3"/>
+            <p:cNvGrpSpPr/>
+            <p:nvPr/>
+          </p:nvGrpSpPr>
+          <p:grpSpPr>
+            <a:xfrm>
+              <a:off x="2584" y="1873"/>
+              <a:ext cx="7771" cy="5478"/>
+              <a:chOff x="2597" y="1738"/>
+              <a:chExt cx="9939" cy="6451"/>
+            </a:xfrm>
+          </p:grpSpPr>
+          <p:sp>
+            <p:nvSpPr>
+              <p:cNvPr id="2" name="图文框 1"/>
+              <p:cNvSpPr/>
+              <p:nvPr/>
+            </p:nvSpPr>
+            <p:spPr>
+              <a:xfrm>
+                <a:off x="2597" y="1738"/>
+                <a:ext cx="9939" cy="6451"/>
+              </a:xfrm>
+              <a:prstGeom prst="frame">
+                <a:avLst/>
+              </a:prstGeom>
+              <a:solidFill>
+                <a:srgbClr val="28402E"/>
+              </a:solidFill>
+            </p:spPr>
+            <p:style>
+              <a:lnRef idx="2">
+                <a:schemeClr val="accent1">
+                  <a:shade val="50000"/>
+                </a:schemeClr>
+              </a:lnRef>
+              <a:fillRef idx="1">
+                <a:schemeClr val="accent1"/>
+              </a:fillRef>
+              <a:effectRef idx="0">
+                <a:schemeClr val="accent1"/>
+              </a:effectRef>
+              <a:fontRef idx="minor">
+                <a:schemeClr val="lt1"/>
+              </a:fontRef>
+            </p:style>
+            <p:txBody>
+              <a:bodyPr rtlCol="0" anchor="ctr"/>
+              <a:p>
+                <a:pPr algn="ctr"/>
+                <a:endParaRPr lang="zh-CN" altLang="en-US">
+                  <a:solidFill>
+                    <a:schemeClr val="tx1"/>
+                  </a:solidFill>
+                </a:endParaRPr>
+              </a:p>
+            </p:txBody>
+          </p:sp>
+          <p:sp>
+            <p:nvSpPr>
+              <p:cNvPr id="3" name="文本框 2"/>
+              <p:cNvSpPr txBox="true"/>
+              <p:nvPr/>
+            </p:nvSpPr>
+            <p:spPr>
+              <a:xfrm>
+                <a:off x="4868" y="4724"/>
+                <a:ext cx="5271" cy="606"/>
+              </a:xfrm>
+              <a:prstGeom prst="rect">
+                <a:avLst/>
+              </a:prstGeom>
+              <a:noFill/>
+            </p:spPr>
+            <p:txBody>
+              <a:bodyPr wrap="square" rtlCol="0">
+                <a:spAutoFit/>
+              </a:bodyPr>
+              <a:p>
+                <a:pPr algn="ctr"/>
+                <a:r>
+                  <a:rPr lang="" altLang="zh-CN"/>
+                  <a:t>Main monitoring area</a:t>
+                </a:r>
+                <a:endParaRPr lang="" altLang="zh-CN"/>
+              </a:p>
+            </p:txBody>
+          </p:sp>
+        </p:grpSp>
+        <p:grpSp>
+          <p:nvGrpSpPr>
+            <p:cNvPr id="12" name="组合 11"/>
+            <p:cNvGrpSpPr/>
+            <p:nvPr/>
+          </p:nvGrpSpPr>
+          <p:grpSpPr>
+            <a:xfrm>
+              <a:off x="35" y="-1"/>
+              <a:ext cx="10320" cy="7353"/>
+              <a:chOff x="35" y="-3"/>
+              <a:chExt cx="12525" cy="10351"/>
+            </a:xfrm>
+          </p:grpSpPr>
+          <p:sp>
+            <p:nvSpPr>
+              <p:cNvPr id="5" name="圆角矩形 4"/>
+              <p:cNvSpPr/>
+              <p:nvPr/>
+            </p:nvSpPr>
+            <p:spPr>
+              <a:xfrm>
+                <a:off x="36" y="25"/>
+                <a:ext cx="3092" cy="2571"/>
+              </a:xfrm>
+              <a:prstGeom prst="roundRect">
+                <a:avLst/>
+              </a:prstGeom>
+            </p:spPr>
+            <p:style>
+              <a:lnRef idx="2">
+                <a:schemeClr val="accent4">
+                  <a:shade val="50000"/>
+                </a:schemeClr>
+              </a:lnRef>
+              <a:fillRef idx="1">
+                <a:schemeClr val="accent4"/>
+              </a:fillRef>
+              <a:effectRef idx="0">
+                <a:schemeClr val="accent4"/>
+              </a:effectRef>
+              <a:fontRef idx="minor">
+                <a:schemeClr val="lt1"/>
+              </a:fontRef>
+            </p:style>
+            <p:txBody>
+              <a:bodyPr rtlCol="0" anchor="ctr"/>
+              <a:p>
+                <a:pPr algn="ctr"/>
+                <a:endParaRPr lang="zh-CN" altLang="en-US"/>
+              </a:p>
+            </p:txBody>
+          </p:sp>
+          <p:sp>
+            <p:nvSpPr>
+              <p:cNvPr id="6" name="圆角矩形 5"/>
+              <p:cNvSpPr/>
+              <p:nvPr/>
+            </p:nvSpPr>
+            <p:spPr>
+              <a:xfrm>
+                <a:off x="3164" y="5"/>
+                <a:ext cx="3092" cy="2571"/>
+              </a:xfrm>
+              <a:prstGeom prst="roundRect">
+                <a:avLst/>
+              </a:prstGeom>
+            </p:spPr>
+            <p:style>
+              <a:lnRef idx="2">
+                <a:schemeClr val="accent4">
+                  <a:shade val="50000"/>
+                </a:schemeClr>
+              </a:lnRef>
+              <a:fillRef idx="1">
+                <a:schemeClr val="accent4"/>
+              </a:fillRef>
+              <a:effectRef idx="0">
+                <a:schemeClr val="accent4"/>
+              </a:effectRef>
+              <a:fontRef idx="minor">
+                <a:schemeClr val="lt1"/>
+              </a:fontRef>
+            </p:style>
+            <p:txBody>
+              <a:bodyPr rtlCol="0" anchor="ctr"/>
+              <a:p>
+                <a:pPr algn="ctr"/>
+                <a:endParaRPr lang="zh-CN" altLang="en-US"/>
+              </a:p>
+            </p:txBody>
+          </p:sp>
+          <p:sp>
+            <p:nvSpPr>
+              <p:cNvPr id="7" name="圆角矩形 6"/>
+              <p:cNvSpPr/>
+              <p:nvPr/>
+            </p:nvSpPr>
+            <p:spPr>
+              <a:xfrm>
+                <a:off x="36" y="2635"/>
+                <a:ext cx="3092" cy="2571"/>
+              </a:xfrm>
+              <a:prstGeom prst="roundRect">
+                <a:avLst/>
+              </a:prstGeom>
+            </p:spPr>
+            <p:style>
+              <a:lnRef idx="2">
+                <a:schemeClr val="accent4">
+                  <a:shade val="50000"/>
+                </a:schemeClr>
+              </a:lnRef>
+              <a:fillRef idx="1">
+                <a:schemeClr val="accent4"/>
+              </a:fillRef>
+              <a:effectRef idx="0">
+                <a:schemeClr val="accent4"/>
+              </a:effectRef>
+              <a:fontRef idx="minor">
+                <a:schemeClr val="lt1"/>
+              </a:fontRef>
+            </p:style>
+            <p:txBody>
+              <a:bodyPr rtlCol="0" anchor="ctr"/>
+              <a:p>
+                <a:pPr algn="ctr"/>
+                <a:endParaRPr lang="zh-CN" altLang="en-US"/>
+              </a:p>
+            </p:txBody>
+          </p:sp>
+          <p:sp>
+            <p:nvSpPr>
+              <p:cNvPr id="8" name="圆角矩形 7"/>
+              <p:cNvSpPr/>
+              <p:nvPr/>
+            </p:nvSpPr>
+            <p:spPr>
+              <a:xfrm>
+                <a:off x="6256" y="25"/>
+                <a:ext cx="3092" cy="2571"/>
+              </a:xfrm>
+              <a:prstGeom prst="roundRect">
+                <a:avLst/>
+              </a:prstGeom>
+            </p:spPr>
+            <p:style>
+              <a:lnRef idx="2">
+                <a:schemeClr val="accent4">
+                  <a:shade val="50000"/>
+                </a:schemeClr>
+              </a:lnRef>
+              <a:fillRef idx="1">
+                <a:schemeClr val="accent4"/>
+              </a:fillRef>
+              <a:effectRef idx="0">
+                <a:schemeClr val="accent4"/>
+              </a:effectRef>
+              <a:fontRef idx="minor">
+                <a:schemeClr val="lt1"/>
+              </a:fontRef>
+            </p:style>
+            <p:txBody>
+              <a:bodyPr rtlCol="0" anchor="ctr"/>
+              <a:p>
+                <a:pPr algn="ctr"/>
+                <a:endParaRPr lang="zh-CN" altLang="en-US"/>
+              </a:p>
+            </p:txBody>
+          </p:sp>
+          <p:sp>
+            <p:nvSpPr>
+              <p:cNvPr id="9" name="圆角矩形 8"/>
+              <p:cNvSpPr/>
+              <p:nvPr/>
+            </p:nvSpPr>
+            <p:spPr>
+              <a:xfrm>
+                <a:off x="9348" y="64"/>
+                <a:ext cx="3092" cy="2571"/>
+              </a:xfrm>
+              <a:prstGeom prst="roundRect">
+                <a:avLst/>
+              </a:prstGeom>
+            </p:spPr>
+            <p:style>
+              <a:lnRef idx="2">
+                <a:schemeClr val="accent4">
+                  <a:shade val="50000"/>
+                </a:schemeClr>
+              </a:lnRef>
+              <a:fillRef idx="1">
+                <a:schemeClr val="accent4"/>
+              </a:fillRef>
+              <a:effectRef idx="0">
+                <a:schemeClr val="accent4"/>
+              </a:effectRef>
+              <a:fontRef idx="minor">
+                <a:schemeClr val="lt1"/>
+              </a:fontRef>
+            </p:style>
+            <p:txBody>
+              <a:bodyPr rtlCol="0" anchor="ctr"/>
+              <a:p>
+                <a:pPr algn="ctr"/>
+                <a:endParaRPr lang="zh-CN" altLang="en-US"/>
+              </a:p>
+            </p:txBody>
+          </p:sp>
+          <p:sp>
+            <p:nvSpPr>
+              <p:cNvPr id="10" name="矩形 9"/>
+              <p:cNvSpPr/>
+              <p:nvPr/>
+            </p:nvSpPr>
+            <p:spPr>
+              <a:xfrm>
+                <a:off x="36" y="5206"/>
+                <a:ext cx="3092" cy="2571"/>
+              </a:xfrm>
+              <a:prstGeom prst="rect">
+                <a:avLst/>
+              </a:prstGeom>
+              <a:solidFill>
+                <a:schemeClr val="accent6">
+                  <a:lumMod val="20000"/>
+                  <a:lumOff val="80000"/>
+                </a:schemeClr>
+              </a:solidFill>
+            </p:spPr>
+            <p:style>
+              <a:lnRef idx="1">
+                <a:schemeClr val="accent4"/>
+              </a:lnRef>
+              <a:fillRef idx="2">
+                <a:schemeClr val="accent4"/>
+              </a:fillRef>
+              <a:effectRef idx="1">
+                <a:schemeClr val="accent4"/>
+              </a:effectRef>
+              <a:fontRef idx="minor">
+                <a:schemeClr val="dk1"/>
+              </a:fontRef>
+            </p:style>
+            <p:txBody>
+              <a:bodyPr rtlCol="0" anchor="ctr"/>
+              <a:p>
+                <a:pPr algn="ctr"/>
+                <a:endParaRPr lang="zh-CN" altLang="en-US"/>
+              </a:p>
+            </p:txBody>
+          </p:sp>
+          <p:sp>
+            <p:nvSpPr>
+              <p:cNvPr id="11" name="矩形 10"/>
+              <p:cNvSpPr/>
+              <p:nvPr/>
+            </p:nvSpPr>
+            <p:spPr>
+              <a:xfrm>
+                <a:off x="36" y="7777"/>
+                <a:ext cx="3092" cy="2571"/>
+              </a:xfrm>
+              <a:prstGeom prst="rect">
+                <a:avLst/>
+              </a:prstGeom>
+              <a:solidFill>
+                <a:schemeClr val="accent6">
+                  <a:lumMod val="20000"/>
+                  <a:lumOff val="80000"/>
+                </a:schemeClr>
+              </a:solidFill>
+            </p:spPr>
+            <p:style>
+              <a:lnRef idx="1">
+                <a:schemeClr val="accent4"/>
+              </a:lnRef>
+              <a:fillRef idx="2">
+                <a:schemeClr val="accent4"/>
+              </a:fillRef>
+              <a:effectRef idx="1">
+                <a:schemeClr val="accent4"/>
+              </a:effectRef>
+              <a:fontRef idx="minor">
+                <a:schemeClr val="dk1"/>
+              </a:fontRef>
+            </p:style>
+            <p:txBody>
+              <a:bodyPr rtlCol="0" anchor="ctr"/>
+              <a:p>
+                <a:pPr algn="ctr"/>
+                <a:endParaRPr lang="zh-CN" altLang="en-US"/>
+              </a:p>
+            </p:txBody>
+          </p:sp>
+          <p:sp>
+            <p:nvSpPr>
+              <p:cNvPr id="23" name="圆角矩形 22"/>
+              <p:cNvSpPr/>
+              <p:nvPr/>
+            </p:nvSpPr>
+            <p:spPr>
+              <a:xfrm>
+                <a:off x="6256" y="25"/>
+                <a:ext cx="3092" cy="2571"/>
+              </a:xfrm>
+              <a:prstGeom prst="roundRect">
+                <a:avLst/>
+              </a:prstGeom>
+            </p:spPr>
+            <p:style>
+              <a:lnRef idx="2">
+                <a:schemeClr val="accent4">
+                  <a:shade val="50000"/>
+                </a:schemeClr>
+              </a:lnRef>
+              <a:fillRef idx="1">
+                <a:schemeClr val="accent4"/>
+              </a:fillRef>
+              <a:effectRef idx="0">
+                <a:schemeClr val="accent4"/>
+              </a:effectRef>
+              <a:fontRef idx="minor">
+                <a:schemeClr val="lt1"/>
+              </a:fontRef>
+            </p:style>
+            <p:txBody>
+              <a:bodyPr rtlCol="0" anchor="ctr"/>
+              <a:p>
+                <a:pPr algn="ctr"/>
+                <a:endParaRPr lang="zh-CN" altLang="en-US"/>
+              </a:p>
+            </p:txBody>
+          </p:sp>
+          <p:sp>
+            <p:nvSpPr>
+              <p:cNvPr id="24" name="圆角矩形 23"/>
+              <p:cNvSpPr/>
+              <p:nvPr/>
+            </p:nvSpPr>
+            <p:spPr>
+              <a:xfrm>
+                <a:off x="9348" y="64"/>
+                <a:ext cx="3092" cy="2571"/>
+              </a:xfrm>
+              <a:prstGeom prst="roundRect">
+                <a:avLst/>
+              </a:prstGeom>
+            </p:spPr>
+            <p:style>
+              <a:lnRef idx="2">
+                <a:schemeClr val="accent4">
+                  <a:shade val="50000"/>
+                </a:schemeClr>
+              </a:lnRef>
+              <a:fillRef idx="1">
+                <a:schemeClr val="accent4"/>
+              </a:fillRef>
+              <a:effectRef idx="0">
+                <a:schemeClr val="accent4"/>
+              </a:effectRef>
+              <a:fontRef idx="minor">
+                <a:schemeClr val="lt1"/>
+              </a:fontRef>
+            </p:style>
+            <p:txBody>
+              <a:bodyPr rtlCol="0" anchor="ctr"/>
+              <a:p>
+                <a:pPr algn="ctr"/>
+                <a:endParaRPr lang="zh-CN" altLang="en-US"/>
+              </a:p>
+            </p:txBody>
+          </p:sp>
+          <p:sp>
+            <p:nvSpPr>
+              <p:cNvPr id="25" name="矩形 24"/>
+              <p:cNvSpPr/>
+              <p:nvPr/>
+            </p:nvSpPr>
+            <p:spPr>
+              <a:xfrm>
+                <a:off x="35" y="45"/>
+                <a:ext cx="3092" cy="2571"/>
+              </a:xfrm>
+              <a:prstGeom prst="rect">
+                <a:avLst/>
+              </a:prstGeom>
+              <a:solidFill>
+                <a:schemeClr val="accent6">
+                  <a:lumMod val="20000"/>
+                  <a:lumOff val="80000"/>
+                </a:schemeClr>
+              </a:solidFill>
+            </p:spPr>
+            <p:style>
+              <a:lnRef idx="1">
+                <a:schemeClr val="accent4"/>
+              </a:lnRef>
+              <a:fillRef idx="2">
+                <a:schemeClr val="accent4"/>
+              </a:fillRef>
+              <a:effectRef idx="1">
+                <a:schemeClr val="accent4"/>
+              </a:effectRef>
+              <a:fontRef idx="minor">
+                <a:schemeClr val="dk1"/>
+              </a:fontRef>
+            </p:style>
+            <p:txBody>
+              <a:bodyPr rtlCol="0" anchor="ctr"/>
+              <a:p>
+                <a:pPr algn="ctr"/>
+                <a:endParaRPr lang="zh-CN" altLang="en-US"/>
+              </a:p>
+            </p:txBody>
+          </p:sp>
+          <p:sp>
+            <p:nvSpPr>
+              <p:cNvPr id="26" name="矩形 25"/>
+              <p:cNvSpPr/>
+              <p:nvPr/>
+            </p:nvSpPr>
+            <p:spPr>
+              <a:xfrm>
+                <a:off x="3164" y="10"/>
+                <a:ext cx="3092" cy="2646"/>
+              </a:xfrm>
+              <a:prstGeom prst="rect">
+                <a:avLst/>
+              </a:prstGeom>
+              <a:solidFill>
+                <a:schemeClr val="accent6">
+                  <a:lumMod val="20000"/>
+                  <a:lumOff val="80000"/>
+                </a:schemeClr>
+              </a:solidFill>
+            </p:spPr>
+            <p:style>
+              <a:lnRef idx="1">
+                <a:schemeClr val="accent4"/>
+              </a:lnRef>
+              <a:fillRef idx="2">
+                <a:schemeClr val="accent4"/>
+              </a:fillRef>
+              <a:effectRef idx="1">
+                <a:schemeClr val="accent4"/>
+              </a:effectRef>
+              <a:fontRef idx="minor">
+                <a:schemeClr val="dk1"/>
+              </a:fontRef>
+            </p:style>
+            <p:txBody>
+              <a:bodyPr rtlCol="0" anchor="ctr"/>
+              <a:p>
+                <a:pPr algn="ctr"/>
+                <a:endParaRPr lang="zh-CN" altLang="en-US"/>
+              </a:p>
+            </p:txBody>
+          </p:sp>
+          <p:sp>
+            <p:nvSpPr>
+              <p:cNvPr id="27" name="矩形 26"/>
+              <p:cNvSpPr/>
+              <p:nvPr/>
+            </p:nvSpPr>
+            <p:spPr>
+              <a:xfrm>
+                <a:off x="36" y="2655"/>
+                <a:ext cx="3092" cy="2571"/>
+              </a:xfrm>
+              <a:prstGeom prst="rect">
+                <a:avLst/>
+              </a:prstGeom>
+              <a:solidFill>
+                <a:schemeClr val="accent6">
+                  <a:lumMod val="20000"/>
+                  <a:lumOff val="80000"/>
+                </a:schemeClr>
+              </a:solidFill>
+            </p:spPr>
+            <p:style>
+              <a:lnRef idx="1">
+                <a:schemeClr val="accent4"/>
+              </a:lnRef>
+              <a:fillRef idx="2">
+                <a:schemeClr val="accent4"/>
+              </a:fillRef>
+              <a:effectRef idx="1">
+                <a:schemeClr val="accent4"/>
+              </a:effectRef>
+              <a:fontRef idx="minor">
+                <a:schemeClr val="dk1"/>
+              </a:fontRef>
+            </p:style>
+            <p:txBody>
+              <a:bodyPr rtlCol="0" anchor="ctr"/>
+              <a:p>
+                <a:pPr algn="ctr"/>
+                <a:endParaRPr lang="zh-CN" altLang="en-US"/>
+              </a:p>
+            </p:txBody>
+          </p:sp>
+          <p:sp>
+            <p:nvSpPr>
+              <p:cNvPr id="28" name="矩形 27"/>
+              <p:cNvSpPr/>
+              <p:nvPr/>
+            </p:nvSpPr>
+            <p:spPr>
+              <a:xfrm>
+                <a:off x="6257" y="-3"/>
+                <a:ext cx="3092" cy="2659"/>
+              </a:xfrm>
+              <a:prstGeom prst="rect">
+                <a:avLst/>
+              </a:prstGeom>
+              <a:solidFill>
+                <a:schemeClr val="accent6">
+                  <a:lumMod val="20000"/>
+                  <a:lumOff val="80000"/>
+                </a:schemeClr>
+              </a:solidFill>
+            </p:spPr>
+            <p:style>
+              <a:lnRef idx="1">
+                <a:schemeClr val="accent4"/>
+              </a:lnRef>
+              <a:fillRef idx="2">
+                <a:schemeClr val="accent4"/>
+              </a:fillRef>
+              <a:effectRef idx="1">
+                <a:schemeClr val="accent4"/>
+              </a:effectRef>
+              <a:fontRef idx="minor">
+                <a:schemeClr val="dk1"/>
+              </a:fontRef>
+            </p:style>
+            <p:txBody>
+              <a:bodyPr rtlCol="0" anchor="ctr"/>
+              <a:p>
+                <a:pPr algn="ctr"/>
+                <a:endParaRPr lang="zh-CN" altLang="en-US"/>
+              </a:p>
+            </p:txBody>
+          </p:sp>
+          <p:sp>
+            <p:nvSpPr>
+              <p:cNvPr id="29" name="矩形 28"/>
+              <p:cNvSpPr/>
+              <p:nvPr/>
+            </p:nvSpPr>
+            <p:spPr>
+              <a:xfrm>
+                <a:off x="9348" y="5"/>
+                <a:ext cx="3212" cy="2650"/>
+              </a:xfrm>
+              <a:prstGeom prst="rect">
+                <a:avLst/>
+              </a:prstGeom>
+              <a:solidFill>
+                <a:schemeClr val="accent6">
+                  <a:lumMod val="20000"/>
+                  <a:lumOff val="80000"/>
+                </a:schemeClr>
+              </a:solidFill>
+            </p:spPr>
+            <p:style>
+              <a:lnRef idx="1">
+                <a:schemeClr val="accent4"/>
+              </a:lnRef>
+              <a:fillRef idx="2">
+                <a:schemeClr val="accent4"/>
+              </a:fillRef>
+              <a:effectRef idx="1">
+                <a:schemeClr val="accent4"/>
+              </a:effectRef>
+              <a:fontRef idx="minor">
+                <a:schemeClr val="dk1"/>
+              </a:fontRef>
+            </p:style>
+            <p:txBody>
+              <a:bodyPr rtlCol="0" anchor="ctr"/>
+              <a:p>
+                <a:pPr algn="ctr"/>
+                <a:endParaRPr lang="zh-CN" altLang="en-US"/>
+              </a:p>
+            </p:txBody>
+          </p:sp>
+        </p:grpSp>
+      </p:grpSp>
+      <p:sp>
+        <p:nvSpPr>
+          <p:cNvPr id="15" name="矩形 14"/>
+          <p:cNvSpPr/>
+          <p:nvPr/>
+        </p:nvSpPr>
+        <p:spPr>
+          <a:xfrm>
+            <a:off x="-30480" y="5229860"/>
+            <a:ext cx="7392670" cy="1639570"/>
+          </a:xfrm>
+          <a:prstGeom prst="rect">
+            <a:avLst/>
+          </a:prstGeom>
+          <a:solidFill>
+            <a:schemeClr val="accent6">
+              <a:lumMod val="60000"/>
+              <a:lumOff val="40000"/>
+            </a:schemeClr>
+          </a:solidFill>
+        </p:spPr>
+        <p:style>
+          <a:lnRef idx="1">
+            <a:schemeClr val="accent5"/>
+          </a:lnRef>
+          <a:fillRef idx="2">
+            <a:schemeClr val="accent5"/>
+          </a:fillRef>
+          <a:effectRef idx="1">
+            <a:schemeClr val="accent5"/>
+          </a:effectRef>
+          <a:fontRef idx="minor">
+            <a:schemeClr val="dk1"/>
+          </a:fontRef>
+        </p:style>
+        <p:txBody>
+          <a:bodyPr rtlCol="0" anchor="ctr"/>
+          <a:p>
+            <a:pPr algn="ctr"/>
+            <a:endParaRPr lang="zh-CN" altLang="en-US"/>
+          </a:p>
+        </p:txBody>
+      </p:sp>
+      <p:sp>
+        <p:nvSpPr>
+          <p:cNvPr id="38" name="矩形 37"/>
+          <p:cNvSpPr/>
+          <p:nvPr/>
+        </p:nvSpPr>
+        <p:spPr>
+          <a:xfrm>
+            <a:off x="7362190" y="5228590"/>
+            <a:ext cx="4826000" cy="1640840"/>
+          </a:xfrm>
+          <a:prstGeom prst="rect">
+            <a:avLst/>
+          </a:prstGeom>
+          <a:solidFill>
+            <a:schemeClr val="accent6">
+              <a:lumMod val="60000"/>
+              <a:lumOff val="40000"/>
+            </a:schemeClr>
+          </a:solidFill>
+        </p:spPr>
+        <p:style>
+          <a:lnRef idx="1">
+            <a:schemeClr val="accent5"/>
+          </a:lnRef>
+          <a:fillRef idx="2">
+            <a:schemeClr val="accent5"/>
+          </a:fillRef>
+          <a:effectRef idx="1">
+            <a:schemeClr val="accent5"/>
+          </a:effectRef>
+          <a:fontRef idx="minor">
+            <a:schemeClr val="dk1"/>
+          </a:fontRef>
+        </p:style>
+        <p:txBody>
+          <a:bodyPr rtlCol="0" anchor="ctr"/>
+          <a:p>
+            <a:pPr algn="ctr"/>
+            <a:endParaRPr lang="zh-CN" altLang="en-US"/>
+          </a:p>
+        </p:txBody>
+      </p:sp>
+      <p:sp>
+        <p:nvSpPr>
+          <p:cNvPr id="39" name="文本框 38"/>
+          <p:cNvSpPr txBox="true"/>
+          <p:nvPr/>
+        </p:nvSpPr>
+        <p:spPr>
+          <a:xfrm>
+            <a:off x="1647825" y="5864860"/>
+            <a:ext cx="4371975" cy="368300"/>
+          </a:xfrm>
+          <a:prstGeom prst="rect">
+            <a:avLst/>
+          </a:prstGeom>
+          <a:noFill/>
+        </p:spPr>
+        <p:txBody>
+          <a:bodyPr wrap="none" rtlCol="0">
+            <a:spAutoFit/>
+          </a:bodyPr>
+          <a:p>
+            <a:pPr algn="l"/>
+            <a:r>
+              <a:rPr lang="zh-CN" altLang="en-US"/>
+              <a:t>Operation area of picture control function</a:t>
+            </a:r>
+            <a:endParaRPr lang="zh-CN" altLang="en-US"/>
+          </a:p>
+        </p:txBody>
+      </p:sp>
+      <p:sp>
+        <p:nvSpPr>
+          <p:cNvPr id="40" name="矩形 39"/>
+          <p:cNvSpPr/>
+          <p:nvPr/>
+        </p:nvSpPr>
+        <p:spPr>
+          <a:xfrm>
+            <a:off x="7362190" y="2623820"/>
+            <a:ext cx="4826000" cy="2606040"/>
+          </a:xfrm>
+          <a:prstGeom prst="rect">
+            <a:avLst/>
+          </a:prstGeom>
+          <a:solidFill>
+            <a:schemeClr val="accent2">
+              <a:lumMod val="40000"/>
+              <a:lumOff val="60000"/>
+            </a:schemeClr>
+          </a:solidFill>
+        </p:spPr>
+        <p:style>
+          <a:lnRef idx="1">
+            <a:schemeClr val="accent5"/>
+          </a:lnRef>
+          <a:fillRef idx="2">
+            <a:schemeClr val="accent5"/>
+          </a:fillRef>
+          <a:effectRef idx="1">
+            <a:schemeClr val="accent5"/>
+          </a:effectRef>
+          <a:fontRef idx="minor">
+            <a:schemeClr val="dk1"/>
+          </a:fontRef>
+        </p:style>
+        <p:txBody>
+          <a:bodyPr rtlCol="0" anchor="ctr"/>
+          <a:p>
+            <a:pPr algn="ctr"/>
+            <a:endParaRPr lang="zh-CN" altLang="en-US"/>
+          </a:p>
+        </p:txBody>
+      </p:sp>
+      <p:sp>
+        <p:nvSpPr>
+          <p:cNvPr id="41" name="矩形 40"/>
+          <p:cNvSpPr/>
+          <p:nvPr/>
+        </p:nvSpPr>
+        <p:spPr>
+          <a:xfrm>
+            <a:off x="7362825" y="-22860"/>
+            <a:ext cx="4826000" cy="2636520"/>
+          </a:xfrm>
+          <a:prstGeom prst="rect">
+            <a:avLst/>
+          </a:prstGeom>
+          <a:solidFill>
+            <a:schemeClr val="accent6">
+              <a:lumMod val="60000"/>
+              <a:lumOff val="40000"/>
+            </a:schemeClr>
+          </a:solidFill>
+        </p:spPr>
+        <p:style>
+          <a:lnRef idx="1">
+            <a:schemeClr val="accent5"/>
+          </a:lnRef>
+          <a:fillRef idx="2">
+            <a:schemeClr val="accent5"/>
+          </a:fillRef>
+          <a:effectRef idx="1">
+            <a:schemeClr val="accent5"/>
+          </a:effectRef>
+          <a:fontRef idx="minor">
+            <a:schemeClr val="dk1"/>
+          </a:fontRef>
+        </p:style>
+        <p:txBody>
+          <a:bodyPr rtlCol="0" anchor="ctr"/>
+          <a:p>
+            <a:pPr algn="ctr"/>
+            <a:endParaRPr lang="zh-CN" altLang="en-US"/>
+          </a:p>
+        </p:txBody>
+      </p:sp>
+      <p:sp>
+        <p:nvSpPr>
+          <p:cNvPr id="42" name="文本框 41"/>
+          <p:cNvSpPr txBox="true"/>
+          <p:nvPr/>
+        </p:nvSpPr>
+        <p:spPr>
+          <a:xfrm>
+            <a:off x="8531860" y="3742690"/>
+            <a:ext cx="2489835" cy="368300"/>
+          </a:xfrm>
+          <a:prstGeom prst="rect">
+            <a:avLst/>
+          </a:prstGeom>
+          <a:noFill/>
+        </p:spPr>
+        <p:txBody>
+          <a:bodyPr wrap="none" rtlCol="0">
+            <a:spAutoFit/>
+          </a:bodyPr>
+          <a:p>
+            <a:pPr algn="ctr"/>
+            <a:r>
+              <a:rPr lang="zh-CN" altLang="en-US"/>
+              <a:t>Alarm information area</a:t>
+            </a:r>
+            <a:endParaRPr lang="zh-CN" altLang="en-US"/>
+          </a:p>
+        </p:txBody>
+      </p:sp>
+      <p:sp>
+        <p:nvSpPr>
+          <p:cNvPr id="43" name="文本框 42"/>
+          <p:cNvSpPr txBox="true"/>
+          <p:nvPr/>
+        </p:nvSpPr>
+        <p:spPr>
+          <a:xfrm>
+            <a:off x="8659495" y="5864860"/>
+            <a:ext cx="2233930" cy="368300"/>
+          </a:xfrm>
+          <a:prstGeom prst="rect">
+            <a:avLst/>
+          </a:prstGeom>
+          <a:noFill/>
+        </p:spPr>
+        <p:txBody>
+          <a:bodyPr wrap="none" rtlCol="0">
+            <a:spAutoFit/>
+          </a:bodyPr>
+          <a:p>
+            <a:pPr algn="l"/>
+            <a:r>
+              <a:rPr lang="zh-CN" altLang="en-US"/>
+              <a:t>Monitoring Log Area</a:t>
+            </a:r>
+            <a:endParaRPr lang="zh-CN" altLang="en-US"/>
+          </a:p>
+        </p:txBody>
+      </p:sp>
+      <p:sp>
+        <p:nvSpPr>
+          <p:cNvPr id="44" name="文本框 43"/>
+          <p:cNvSpPr txBox="true"/>
+          <p:nvPr/>
+        </p:nvSpPr>
+        <p:spPr>
+          <a:xfrm>
+            <a:off x="7689850" y="1111250"/>
+            <a:ext cx="4307205" cy="368300"/>
+          </a:xfrm>
+          <a:prstGeom prst="rect">
+            <a:avLst/>
+          </a:prstGeom>
+          <a:noFill/>
+        </p:spPr>
+        <p:txBody>
+          <a:bodyPr wrap="none" rtlCol="0">
+            <a:spAutoFit/>
+          </a:bodyPr>
+          <a:p>
+            <a:pPr algn="ctr"/>
+            <a:r>
+              <a:rPr lang="zh-CN" altLang="en-US"/>
+              <a:t> partial map of the location of the camera</a:t>
+            </a:r>
+            <a:endParaRPr lang="zh-CN" altLang="en-US"/>
           </a:p>
         </p:txBody>
       </p:sp>

</xml_diff>